<commit_message>
make sure slides are in the right order
</commit_message>
<xml_diff>
--- a/profile dis pdb.pptx
+++ b/profile dis pdb.pptx
@@ -19,8 +19,8 @@
     <p:sldId id="266" r:id="rId13"/>
     <p:sldId id="267" r:id="rId14"/>
     <p:sldId id="268" r:id="rId15"/>
-    <p:sldId id="270" r:id="rId16"/>
-    <p:sldId id="275" r:id="rId17"/>
+    <p:sldId id="275" r:id="rId16"/>
+    <p:sldId id="270" r:id="rId17"/>
     <p:sldId id="271" r:id="rId18"/>
     <p:sldId id="272" r:id="rId19"/>
     <p:sldId id="273" r:id="rId20"/>
@@ -5445,6 +5445,13 @@
   <p:clrMapOvr>
     <a:masterClrMapping/>
   </p:clrMapOvr>
+  <p:timing>
+    <p:tnLst>
+      <p:par>
+        <p:cTn xmlns:p14="http://schemas.microsoft.com/office/powerpoint/2010/main" id="1" dur="indefinite" restart="never" nodeType="tmRoot"/>
+      </p:par>
+    </p:tnLst>
+  </p:timing>
 </p:sld>
 </file>
 
@@ -5747,6 +5754,13 @@
   <p:clrMapOvr>
     <a:masterClrMapping/>
   </p:clrMapOvr>
+  <p:timing>
+    <p:tnLst>
+      <p:par>
+        <p:cTn xmlns:p14="http://schemas.microsoft.com/office/powerpoint/2010/main" id="1" dur="indefinite" restart="never" nodeType="tmRoot"/>
+      </p:par>
+    </p:tnLst>
+  </p:timing>
 </p:sld>
 </file>
 
@@ -5856,6 +5870,13 @@
   <p:clrMapOvr>
     <a:masterClrMapping/>
   </p:clrMapOvr>
+  <p:timing>
+    <p:tnLst>
+      <p:par>
+        <p:cTn xmlns:p14="http://schemas.microsoft.com/office/powerpoint/2010/main" id="1" dur="indefinite" restart="never" nodeType="tmRoot"/>
+      </p:par>
+    </p:tnLst>
+  </p:timing>
 </p:sld>
 </file>
 
@@ -6022,6 +6043,13 @@
   <p:clrMapOvr>
     <a:masterClrMapping/>
   </p:clrMapOvr>
+  <p:timing>
+    <p:tnLst>
+      <p:par>
+        <p:cTn xmlns:p14="http://schemas.microsoft.com/office/powerpoint/2010/main" id="1" dur="indefinite" restart="never" nodeType="tmRoot"/>
+      </p:par>
+    </p:tnLst>
+  </p:timing>
 </p:sld>
 </file>
 
@@ -6365,6 +6393,13 @@
   <p:clrMapOvr>
     <a:masterClrMapping/>
   </p:clrMapOvr>
+  <p:timing>
+    <p:tnLst>
+      <p:par>
+        <p:cTn xmlns:p14="http://schemas.microsoft.com/office/powerpoint/2010/main" id="1" dur="indefinite" restart="never" nodeType="tmRoot"/>
+      </p:par>
+    </p:tnLst>
+  </p:timing>
 </p:sld>
 </file>
 
@@ -6402,50 +6437,29 @@
           <a:p>
             <a:r>
               <a:rPr lang="en-US" dirty="0" smtClean="0"/>
-              <a:t>Debugging</a:t>
+              <a:t>Live Demo</a:t>
             </a:r>
             <a:endParaRPr lang="en-US" dirty="0"/>
-          </a:p>
-        </p:txBody>
-      </p:sp>
-      <p:sp>
-        <p:nvSpPr>
-          <p:cNvPr id="3" name="Content Placeholder 2"/>
-          <p:cNvSpPr>
-            <a:spLocks noGrp="1"/>
-          </p:cNvSpPr>
-          <p:nvPr>
-            <p:ph idx="1"/>
-          </p:nvPr>
-        </p:nvSpPr>
-        <p:spPr/>
-        <p:txBody>
-          <a:bodyPr/>
-          <a:lstStyle/>
-          <a:p>
-            <a:r>
-              <a:rPr lang="en-US" dirty="0" smtClean="0"/>
-              <a:t>Following executions paths of your scripts</a:t>
-            </a:r>
-          </a:p>
-          <a:p>
-            <a:r>
-              <a:rPr lang="en-US" dirty="0" smtClean="0"/>
-              <a:t>Helps to find bugs in execution of your scripts</a:t>
-            </a:r>
           </a:p>
         </p:txBody>
       </p:sp>
     </p:spTree>
     <p:extLst>
       <p:ext uri="{BB962C8B-B14F-4D97-AF65-F5344CB8AC3E}">
-        <p14:creationId xmlns:p14="http://schemas.microsoft.com/office/powerpoint/2010/main" val="2213329654"/>
+        <p14:creationId xmlns:p14="http://schemas.microsoft.com/office/powerpoint/2010/main" val="2172428809"/>
       </p:ext>
     </p:extLst>
   </p:cSld>
   <p:clrMapOvr>
     <a:masterClrMapping/>
   </p:clrMapOvr>
+  <p:timing>
+    <p:tnLst>
+      <p:par>
+        <p:cTn xmlns:p14="http://schemas.microsoft.com/office/powerpoint/2010/main" id="1" dur="indefinite" restart="never" nodeType="tmRoot"/>
+      </p:par>
+    </p:tnLst>
+  </p:timing>
 </p:sld>
 </file>
 
@@ -6483,22 +6497,57 @@
           <a:p>
             <a:r>
               <a:rPr lang="en-US" dirty="0" smtClean="0"/>
-              <a:t>Live Demo</a:t>
+              <a:t>Debugging</a:t>
             </a:r>
             <a:endParaRPr lang="en-US" dirty="0"/>
+          </a:p>
+        </p:txBody>
+      </p:sp>
+      <p:sp>
+        <p:nvSpPr>
+          <p:cNvPr id="3" name="Content Placeholder 2"/>
+          <p:cNvSpPr>
+            <a:spLocks noGrp="1"/>
+          </p:cNvSpPr>
+          <p:nvPr>
+            <p:ph idx="1"/>
+          </p:nvPr>
+        </p:nvSpPr>
+        <p:spPr/>
+        <p:txBody>
+          <a:bodyPr/>
+          <a:lstStyle/>
+          <a:p>
+            <a:r>
+              <a:rPr lang="en-US" dirty="0" smtClean="0"/>
+              <a:t>Following executions paths of your scripts</a:t>
+            </a:r>
+          </a:p>
+          <a:p>
+            <a:r>
+              <a:rPr lang="en-US" dirty="0" smtClean="0"/>
+              <a:t>Helps to find bugs in execution of your scripts</a:t>
+            </a:r>
           </a:p>
         </p:txBody>
       </p:sp>
     </p:spTree>
     <p:extLst>
       <p:ext uri="{BB962C8B-B14F-4D97-AF65-F5344CB8AC3E}">
-        <p14:creationId xmlns:p14="http://schemas.microsoft.com/office/powerpoint/2010/main" val="2172428809"/>
+        <p14:creationId xmlns:p14="http://schemas.microsoft.com/office/powerpoint/2010/main" val="2213329654"/>
       </p:ext>
     </p:extLst>
   </p:cSld>
   <p:clrMapOvr>
     <a:masterClrMapping/>
   </p:clrMapOvr>
+  <p:timing>
+    <p:tnLst>
+      <p:par>
+        <p:cTn xmlns:p14="http://schemas.microsoft.com/office/powerpoint/2010/main" id="1" dur="indefinite" restart="never" nodeType="tmRoot"/>
+      </p:par>
+    </p:tnLst>
+  </p:timing>
 </p:sld>
 </file>
 
@@ -6609,6 +6658,13 @@
   <p:clrMapOvr>
     <a:masterClrMapping/>
   </p:clrMapOvr>
+  <p:timing>
+    <p:tnLst>
+      <p:par>
+        <p:cTn xmlns:p14="http://schemas.microsoft.com/office/powerpoint/2010/main" id="1" dur="indefinite" restart="never" nodeType="tmRoot"/>
+      </p:par>
+    </p:tnLst>
+  </p:timing>
 </p:sld>
 </file>
 
@@ -6905,6 +6961,13 @@
   <p:clrMapOvr>
     <a:masterClrMapping/>
   </p:clrMapOvr>
+  <p:timing>
+    <p:tnLst>
+      <p:par>
+        <p:cTn xmlns:p14="http://schemas.microsoft.com/office/powerpoint/2010/main" id="1" dur="indefinite" restart="never" nodeType="tmRoot"/>
+      </p:par>
+    </p:tnLst>
+  </p:timing>
 </p:sld>
 </file>
 
@@ -7091,6 +7154,13 @@
   <p:clrMapOvr>
     <a:masterClrMapping/>
   </p:clrMapOvr>
+  <p:timing>
+    <p:tnLst>
+      <p:par>
+        <p:cTn xmlns:p14="http://schemas.microsoft.com/office/powerpoint/2010/main" id="1" dur="indefinite" restart="never" nodeType="tmRoot"/>
+      </p:par>
+    </p:tnLst>
+  </p:timing>
 </p:sld>
 </file>
 
@@ -7268,6 +7338,13 @@
   <p:clrMapOvr>
     <a:masterClrMapping/>
   </p:clrMapOvr>
+  <p:timing>
+    <p:tnLst>
+      <p:par>
+        <p:cTn xmlns:p14="http://schemas.microsoft.com/office/powerpoint/2010/main" id="1" dur="indefinite" restart="never" nodeType="tmRoot"/>
+      </p:par>
+    </p:tnLst>
+  </p:timing>
 </p:sld>
 </file>
 
@@ -7321,6 +7398,13 @@
   <p:clrMapOvr>
     <a:masterClrMapping/>
   </p:clrMapOvr>
+  <p:timing>
+    <p:tnLst>
+      <p:par>
+        <p:cTn xmlns:p14="http://schemas.microsoft.com/office/powerpoint/2010/main" id="1" dur="indefinite" restart="never" nodeType="tmRoot"/>
+      </p:par>
+    </p:tnLst>
+  </p:timing>
 </p:sld>
 </file>
 
@@ -7374,6 +7458,13 @@
   <p:clrMapOvr>
     <a:masterClrMapping/>
   </p:clrMapOvr>
+  <p:timing>
+    <p:tnLst>
+      <p:par>
+        <p:cTn xmlns:p14="http://schemas.microsoft.com/office/powerpoint/2010/main" id="1" dur="indefinite" restart="never" nodeType="tmRoot"/>
+      </p:par>
+    </p:tnLst>
+  </p:timing>
 </p:sld>
 </file>
 
@@ -8102,6 +8193,13 @@
   <p:clrMapOvr>
     <a:masterClrMapping/>
   </p:clrMapOvr>
+  <p:timing>
+    <p:tnLst>
+      <p:par>
+        <p:cTn xmlns:p14="http://schemas.microsoft.com/office/powerpoint/2010/main" id="1" dur="indefinite" restart="never" nodeType="tmRoot"/>
+      </p:par>
+    </p:tnLst>
+  </p:timing>
 </p:sld>
 </file>
 

</xml_diff>